<commit_message>
Added Farbverlauf in Titlebox
</commit_message>
<xml_diff>
--- a/Poster.pptx
+++ b/Poster.pptx
@@ -15,7 +15,7 @@
 </p:presentation>
 </file>
 
-<file path=ppt/charts/chart25.xml><?xml version="1.0" encoding="utf-8"?>
+<file path=ppt/charts/chart28.xml><?xml version="1.0" encoding="utf-8"?>
 <c:chartSpace xmlns:c="http://schemas.openxmlformats.org/drawingml/2006/chart" xmlns:a="http://schemas.openxmlformats.org/drawingml/2006/main" xmlns:r="http://schemas.openxmlformats.org/officeDocument/2006/relationships">
   <c:lang val="en-US"/>
   <c:roundedCorners val="0"/>
@@ -249,11 +249,11 @@
         </c:ser>
         <c:gapWidth val="150"/>
         <c:overlap val="0"/>
-        <c:axId val="22977391"/>
-        <c:axId val="55701302"/>
+        <c:axId val="50924228"/>
+        <c:axId val="98556566"/>
       </c:barChart>
       <c:catAx>
-        <c:axId val="22977391"/>
+        <c:axId val="50924228"/>
         <c:scaling>
           <c:orientation val="minMax"/>
         </c:scaling>
@@ -290,14 +290,14 @@
             </a:pPr>
           </a:p>
         </c:txPr>
-        <c:crossAx val="55701302"/>
+        <c:crossAx val="98556566"/>
         <c:crosses val="autoZero"/>
         <c:auto val="1"/>
         <c:lblAlgn val="ctr"/>
         <c:lblOffset val="100"/>
       </c:catAx>
       <c:valAx>
-        <c:axId val="55701302"/>
+        <c:axId val="98556566"/>
         <c:scaling>
           <c:orientation val="minMax"/>
         </c:scaling>
@@ -344,7 +344,7 @@
             </a:pPr>
           </a:p>
         </c:txPr>
-        <c:crossAx val="22977391"/>
+        <c:crossAx val="50924228"/>
         <c:crosses val="autoZero"/>
         <c:crossBetween val="midCat"/>
       </c:valAx>
@@ -379,7 +379,7 @@
 </c:chartSpace>
 </file>
 
-<file path=ppt/charts/chart26.xml><?xml version="1.0" encoding="utf-8"?>
+<file path=ppt/charts/chart29.xml><?xml version="1.0" encoding="utf-8"?>
 <c:chartSpace xmlns:c="http://schemas.openxmlformats.org/drawingml/2006/chart" xmlns:a="http://schemas.openxmlformats.org/drawingml/2006/main" xmlns:r="http://schemas.openxmlformats.org/officeDocument/2006/relationships">
   <c:lang val="en-US"/>
   <c:roundedCorners val="0"/>
@@ -653,11 +653,11 @@
           </c:spPr>
         </c:hiLowLines>
         <c:marker val="1"/>
-        <c:axId val="5010899"/>
-        <c:axId val="79013544"/>
+        <c:axId val="27704884"/>
+        <c:axId val="18484371"/>
       </c:lineChart>
       <c:catAx>
-        <c:axId val="5010899"/>
+        <c:axId val="27704884"/>
         <c:scaling>
           <c:orientation val="minMax"/>
         </c:scaling>
@@ -694,14 +694,14 @@
             </a:pPr>
           </a:p>
         </c:txPr>
-        <c:crossAx val="79013544"/>
+        <c:crossAx val="18484371"/>
         <c:crosses val="autoZero"/>
         <c:auto val="1"/>
         <c:lblAlgn val="ctr"/>
         <c:lblOffset val="100"/>
       </c:catAx>
       <c:valAx>
-        <c:axId val="79013544"/>
+        <c:axId val="18484371"/>
         <c:scaling>
           <c:orientation val="minMax"/>
         </c:scaling>
@@ -748,7 +748,7 @@
             </a:pPr>
           </a:p>
         </c:txPr>
-        <c:crossAx val="5010899"/>
+        <c:crossAx val="27704884"/>
         <c:crosses val="autoZero"/>
         <c:crossBetween val="midCat"/>
       </c:valAx>
@@ -783,7 +783,7 @@
 </c:chartSpace>
 </file>
 
-<file path=ppt/charts/chart27.xml><?xml version="1.0" encoding="utf-8"?>
+<file path=ppt/charts/chart30.xml><?xml version="1.0" encoding="utf-8"?>
 <c:chartSpace xmlns:c="http://schemas.openxmlformats.org/drawingml/2006/chart" xmlns:a="http://schemas.openxmlformats.org/drawingml/2006/main" xmlns:r="http://schemas.openxmlformats.org/officeDocument/2006/relationships">
   <c:lang val="en-US"/>
   <c:roundedCorners val="0"/>
@@ -1578,7 +1578,7 @@
           <a:bodyPr lIns="0" rIns="0" tIns="0" bIns="0" anchor="b"/>
           <a:p>
             <a:pPr algn="r"/>
-            <a:fld id="{F2A95DE3-CC22-445E-8A46-ECCE01C900F5}" type="slidenum">
+            <a:fld id="{5ED335FC-53E8-4260-9FE7-4A814D0AB2A1}" type="slidenum">
               <a:rPr b="0" lang="de-DE" sz="1400" spc="-1" strike="noStrike">
                 <a:solidFill>
                   <a:srgbClr val="000000"/>
@@ -1656,7 +1656,7 @@
                 <a:spcPct val="100000"/>
               </a:lnSpc>
             </a:pPr>
-            <a:fld id="{D040C9B6-19EC-40A4-9D06-70610362AABE}" type="slidenum">
+            <a:fld id="{6A00CA97-B501-40B2-A8D6-A2FA9FB98CC5}" type="slidenum">
               <a:rPr b="0" lang="de-DE" sz="1500" spc="-1" strike="noStrike">
                 <a:solidFill>
                   <a:srgbClr val="000000"/>
@@ -3379,651 +3379,7 @@
                 </a:uFill>
                 <a:latin typeface="Times New Roman"/>
               </a:rPr>
-              <a:t>F</a:t>
-            </a:r>
-            <a:r>
-              <a:rPr b="0" lang="en-US" sz="2160" spc="-1" strike="noStrike">
-                <a:solidFill>
-                  <a:srgbClr val="000000"/>
-                </a:solidFill>
-                <a:uFill>
-                  <a:solidFill>
-                    <a:srgbClr val="ffffff"/>
-                  </a:solidFill>
-                </a:uFill>
-                <a:latin typeface="Times New Roman"/>
-              </a:rPr>
-              <a:t>o</a:t>
-            </a:r>
-            <a:r>
-              <a:rPr b="0" lang="en-US" sz="2160" spc="-1" strike="noStrike">
-                <a:solidFill>
-                  <a:srgbClr val="000000"/>
-                </a:solidFill>
-                <a:uFill>
-                  <a:solidFill>
-                    <a:srgbClr val="ffffff"/>
-                  </a:solidFill>
-                </a:uFill>
-                <a:latin typeface="Times New Roman"/>
-              </a:rPr>
-              <a:t>r</a:t>
-            </a:r>
-            <a:r>
-              <a:rPr b="0" lang="en-US" sz="2160" spc="-1" strike="noStrike">
-                <a:solidFill>
-                  <a:srgbClr val="000000"/>
-                </a:solidFill>
-                <a:uFill>
-                  <a:solidFill>
-                    <a:srgbClr val="ffffff"/>
-                  </a:solidFill>
-                </a:uFill>
-                <a:latin typeface="Times New Roman"/>
-              </a:rPr>
-              <a:t>m</a:t>
-            </a:r>
-            <a:r>
-              <a:rPr b="0" lang="en-US" sz="2160" spc="-1" strike="noStrike">
-                <a:solidFill>
-                  <a:srgbClr val="000000"/>
-                </a:solidFill>
-                <a:uFill>
-                  <a:solidFill>
-                    <a:srgbClr val="ffffff"/>
-                  </a:solidFill>
-                </a:uFill>
-                <a:latin typeface="Times New Roman"/>
-              </a:rPr>
-              <a:t>a</a:t>
-            </a:r>
-            <a:r>
-              <a:rPr b="0" lang="en-US" sz="2160" spc="-1" strike="noStrike">
-                <a:solidFill>
-                  <a:srgbClr val="000000"/>
-                </a:solidFill>
-                <a:uFill>
-                  <a:solidFill>
-                    <a:srgbClr val="ffffff"/>
-                  </a:solidFill>
-                </a:uFill>
-                <a:latin typeface="Times New Roman"/>
-              </a:rPr>
-              <a:t>t</a:t>
-            </a:r>
-            <a:r>
-              <a:rPr b="0" lang="en-US" sz="2160" spc="-1" strike="noStrike">
-                <a:solidFill>
-                  <a:srgbClr val="000000"/>
-                </a:solidFill>
-                <a:uFill>
-                  <a:solidFill>
-                    <a:srgbClr val="ffffff"/>
-                  </a:solidFill>
-                </a:uFill>
-                <a:latin typeface="Times New Roman"/>
-              </a:rPr>
-              <a:t> </a:t>
-            </a:r>
-            <a:r>
-              <a:rPr b="0" lang="en-US" sz="2160" spc="-1" strike="noStrike">
-                <a:solidFill>
-                  <a:srgbClr val="000000"/>
-                </a:solidFill>
-                <a:uFill>
-                  <a:solidFill>
-                    <a:srgbClr val="ffffff"/>
-                  </a:solidFill>
-                </a:uFill>
-                <a:latin typeface="Times New Roman"/>
-              </a:rPr>
-              <a:t>d</a:t>
-            </a:r>
-            <a:r>
-              <a:rPr b="0" lang="en-US" sz="2160" spc="-1" strike="noStrike">
-                <a:solidFill>
-                  <a:srgbClr val="000000"/>
-                </a:solidFill>
-                <a:uFill>
-                  <a:solidFill>
-                    <a:srgbClr val="ffffff"/>
-                  </a:solidFill>
-                </a:uFill>
-                <a:latin typeface="Times New Roman"/>
-              </a:rPr>
-              <a:t>e</a:t>
-            </a:r>
-            <a:r>
-              <a:rPr b="0" lang="en-US" sz="2160" spc="-1" strike="noStrike">
-                <a:solidFill>
-                  <a:srgbClr val="000000"/>
-                </a:solidFill>
-                <a:uFill>
-                  <a:solidFill>
-                    <a:srgbClr val="ffffff"/>
-                  </a:solidFill>
-                </a:uFill>
-                <a:latin typeface="Times New Roman"/>
-              </a:rPr>
-              <a:t>s</a:t>
-            </a:r>
-            <a:r>
-              <a:rPr b="0" lang="en-US" sz="2160" spc="-1" strike="noStrike">
-                <a:solidFill>
-                  <a:srgbClr val="000000"/>
-                </a:solidFill>
-                <a:uFill>
-                  <a:solidFill>
-                    <a:srgbClr val="ffffff"/>
-                  </a:solidFill>
-                </a:uFill>
-                <a:latin typeface="Times New Roman"/>
-              </a:rPr>
-              <a:t> </a:t>
-            </a:r>
-            <a:r>
-              <a:rPr b="0" lang="en-US" sz="2160" spc="-1" strike="noStrike">
-                <a:solidFill>
-                  <a:srgbClr val="000000"/>
-                </a:solidFill>
-                <a:uFill>
-                  <a:solidFill>
-                    <a:srgbClr val="ffffff"/>
-                  </a:solidFill>
-                </a:uFill>
-                <a:latin typeface="Times New Roman"/>
-              </a:rPr>
-              <a:t>T</a:t>
-            </a:r>
-            <a:r>
-              <a:rPr b="0" lang="en-US" sz="2160" spc="-1" strike="noStrike">
-                <a:solidFill>
-                  <a:srgbClr val="000000"/>
-                </a:solidFill>
-                <a:uFill>
-                  <a:solidFill>
-                    <a:srgbClr val="ffffff"/>
-                  </a:solidFill>
-                </a:uFill>
-                <a:latin typeface="Times New Roman"/>
-              </a:rPr>
-              <a:t>i</a:t>
-            </a:r>
-            <a:r>
-              <a:rPr b="0" lang="en-US" sz="2160" spc="-1" strike="noStrike">
-                <a:solidFill>
-                  <a:srgbClr val="000000"/>
-                </a:solidFill>
-                <a:uFill>
-                  <a:solidFill>
-                    <a:srgbClr val="ffffff"/>
-                  </a:solidFill>
-                </a:uFill>
-                <a:latin typeface="Times New Roman"/>
-              </a:rPr>
-              <a:t>t</a:t>
-            </a:r>
-            <a:r>
-              <a:rPr b="0" lang="en-US" sz="2160" spc="-1" strike="noStrike">
-                <a:solidFill>
-                  <a:srgbClr val="000000"/>
-                </a:solidFill>
-                <a:uFill>
-                  <a:solidFill>
-                    <a:srgbClr val="ffffff"/>
-                  </a:solidFill>
-                </a:uFill>
-                <a:latin typeface="Times New Roman"/>
-              </a:rPr>
-              <a:t>e</a:t>
-            </a:r>
-            <a:r>
-              <a:rPr b="0" lang="en-US" sz="2160" spc="-1" strike="noStrike">
-                <a:solidFill>
-                  <a:srgbClr val="000000"/>
-                </a:solidFill>
-                <a:uFill>
-                  <a:solidFill>
-                    <a:srgbClr val="ffffff"/>
-                  </a:solidFill>
-                </a:uFill>
-                <a:latin typeface="Times New Roman"/>
-              </a:rPr>
-              <a:t>l</a:t>
-            </a:r>
-            <a:r>
-              <a:rPr b="0" lang="en-US" sz="2160" spc="-1" strike="noStrike">
-                <a:solidFill>
-                  <a:srgbClr val="000000"/>
-                </a:solidFill>
-                <a:uFill>
-                  <a:solidFill>
-                    <a:srgbClr val="ffffff"/>
-                  </a:solidFill>
-                </a:uFill>
-                <a:latin typeface="Times New Roman"/>
-              </a:rPr>
-              <a:t>t</a:t>
-            </a:r>
-            <a:r>
-              <a:rPr b="0" lang="en-US" sz="2160" spc="-1" strike="noStrike">
-                <a:solidFill>
-                  <a:srgbClr val="000000"/>
-                </a:solidFill>
-                <a:uFill>
-                  <a:solidFill>
-                    <a:srgbClr val="ffffff"/>
-                  </a:solidFill>
-                </a:uFill>
-                <a:latin typeface="Times New Roman"/>
-              </a:rPr>
-              <a:t>e</a:t>
-            </a:r>
-            <a:r>
-              <a:rPr b="0" lang="en-US" sz="2160" spc="-1" strike="noStrike">
-                <a:solidFill>
-                  <a:srgbClr val="000000"/>
-                </a:solidFill>
-                <a:uFill>
-                  <a:solidFill>
-                    <a:srgbClr val="ffffff"/>
-                  </a:solidFill>
-                </a:uFill>
-                <a:latin typeface="Times New Roman"/>
-              </a:rPr>
-              <a:t>x</a:t>
-            </a:r>
-            <a:r>
-              <a:rPr b="0" lang="en-US" sz="2160" spc="-1" strike="noStrike">
-                <a:solidFill>
-                  <a:srgbClr val="000000"/>
-                </a:solidFill>
-                <a:uFill>
-                  <a:solidFill>
-                    <a:srgbClr val="ffffff"/>
-                  </a:solidFill>
-                </a:uFill>
-                <a:latin typeface="Times New Roman"/>
-              </a:rPr>
-              <a:t>t</a:t>
-            </a:r>
-            <a:r>
-              <a:rPr b="0" lang="en-US" sz="2160" spc="-1" strike="noStrike">
-                <a:solidFill>
-                  <a:srgbClr val="000000"/>
-                </a:solidFill>
-                <a:uFill>
-                  <a:solidFill>
-                    <a:srgbClr val="ffffff"/>
-                  </a:solidFill>
-                </a:uFill>
-                <a:latin typeface="Times New Roman"/>
-              </a:rPr>
-              <a:t>e</a:t>
-            </a:r>
-            <a:r>
-              <a:rPr b="0" lang="en-US" sz="2160" spc="-1" strike="noStrike">
-                <a:solidFill>
-                  <a:srgbClr val="000000"/>
-                </a:solidFill>
-                <a:uFill>
-                  <a:solidFill>
-                    <a:srgbClr val="ffffff"/>
-                  </a:solidFill>
-                </a:uFill>
-                <a:latin typeface="Times New Roman"/>
-              </a:rPr>
-              <a:t>s</a:t>
-            </a:r>
-            <a:r>
-              <a:rPr b="0" lang="en-US" sz="2160" spc="-1" strike="noStrike">
-                <a:solidFill>
-                  <a:srgbClr val="000000"/>
-                </a:solidFill>
-                <a:uFill>
-                  <a:solidFill>
-                    <a:srgbClr val="ffffff"/>
-                  </a:solidFill>
-                </a:uFill>
-                <a:latin typeface="Times New Roman"/>
-              </a:rPr>
-              <a:t> </a:t>
-            </a:r>
-            <a:r>
-              <a:rPr b="0" lang="en-US" sz="2160" spc="-1" strike="noStrike">
-                <a:solidFill>
-                  <a:srgbClr val="000000"/>
-                </a:solidFill>
-                <a:uFill>
-                  <a:solidFill>
-                    <a:srgbClr val="ffffff"/>
-                  </a:solidFill>
-                </a:uFill>
-                <a:latin typeface="Times New Roman"/>
-              </a:rPr>
-              <a:t>d</a:t>
-            </a:r>
-            <a:r>
-              <a:rPr b="0" lang="en-US" sz="2160" spc="-1" strike="noStrike">
-                <a:solidFill>
-                  <a:srgbClr val="000000"/>
-                </a:solidFill>
-                <a:uFill>
-                  <a:solidFill>
-                    <a:srgbClr val="ffffff"/>
-                  </a:solidFill>
-                </a:uFill>
-                <a:latin typeface="Times New Roman"/>
-              </a:rPr>
-              <a:t>u</a:t>
-            </a:r>
-            <a:r>
-              <a:rPr b="0" lang="en-US" sz="2160" spc="-1" strike="noStrike">
-                <a:solidFill>
-                  <a:srgbClr val="000000"/>
-                </a:solidFill>
-                <a:uFill>
-                  <a:solidFill>
-                    <a:srgbClr val="ffffff"/>
-                  </a:solidFill>
-                </a:uFill>
-                <a:latin typeface="Times New Roman"/>
-              </a:rPr>
-              <a:t>r</a:t>
-            </a:r>
-            <a:r>
-              <a:rPr b="0" lang="en-US" sz="2160" spc="-1" strike="noStrike">
-                <a:solidFill>
-                  <a:srgbClr val="000000"/>
-                </a:solidFill>
-                <a:uFill>
-                  <a:solidFill>
-                    <a:srgbClr val="ffffff"/>
-                  </a:solidFill>
-                </a:uFill>
-                <a:latin typeface="Times New Roman"/>
-              </a:rPr>
-              <a:t>c</a:t>
-            </a:r>
-            <a:r>
-              <a:rPr b="0" lang="en-US" sz="2160" spc="-1" strike="noStrike">
-                <a:solidFill>
-                  <a:srgbClr val="000000"/>
-                </a:solidFill>
-                <a:uFill>
-                  <a:solidFill>
-                    <a:srgbClr val="ffffff"/>
-                  </a:solidFill>
-                </a:uFill>
-                <a:latin typeface="Times New Roman"/>
-              </a:rPr>
-              <a:t>h</a:t>
-            </a:r>
-            <a:r>
-              <a:rPr b="0" lang="en-US" sz="2160" spc="-1" strike="noStrike">
-                <a:solidFill>
-                  <a:srgbClr val="000000"/>
-                </a:solidFill>
-                <a:uFill>
-                  <a:solidFill>
-                    <a:srgbClr val="ffffff"/>
-                  </a:solidFill>
-                </a:uFill>
-                <a:latin typeface="Times New Roman"/>
-              </a:rPr>
-              <a:t> </a:t>
-            </a:r>
-            <a:r>
-              <a:rPr b="0" lang="en-US" sz="2160" spc="-1" strike="noStrike">
-                <a:solidFill>
-                  <a:srgbClr val="000000"/>
-                </a:solidFill>
-                <a:uFill>
-                  <a:solidFill>
-                    <a:srgbClr val="ffffff"/>
-                  </a:solidFill>
-                </a:uFill>
-                <a:latin typeface="Times New Roman"/>
-              </a:rPr>
-              <a:t>K</a:t>
-            </a:r>
-            <a:r>
-              <a:rPr b="0" lang="en-US" sz="2160" spc="-1" strike="noStrike">
-                <a:solidFill>
-                  <a:srgbClr val="000000"/>
-                </a:solidFill>
-                <a:uFill>
-                  <a:solidFill>
-                    <a:srgbClr val="ffffff"/>
-                  </a:solidFill>
-                </a:uFill>
-                <a:latin typeface="Times New Roman"/>
-              </a:rPr>
-              <a:t>l</a:t>
-            </a:r>
-            <a:r>
-              <a:rPr b="0" lang="en-US" sz="2160" spc="-1" strike="noStrike">
-                <a:solidFill>
-                  <a:srgbClr val="000000"/>
-                </a:solidFill>
-                <a:uFill>
-                  <a:solidFill>
-                    <a:srgbClr val="ffffff"/>
-                  </a:solidFill>
-                </a:uFill>
-                <a:latin typeface="Times New Roman"/>
-              </a:rPr>
-              <a:t>i</a:t>
-            </a:r>
-            <a:r>
-              <a:rPr b="0" lang="en-US" sz="2160" spc="-1" strike="noStrike">
-                <a:solidFill>
-                  <a:srgbClr val="000000"/>
-                </a:solidFill>
-                <a:uFill>
-                  <a:solidFill>
-                    <a:srgbClr val="ffffff"/>
-                  </a:solidFill>
-                </a:uFill>
-                <a:latin typeface="Times New Roman"/>
-              </a:rPr>
-              <a:t>c</a:t>
-            </a:r>
-            <a:r>
-              <a:rPr b="0" lang="en-US" sz="2160" spc="-1" strike="noStrike">
-                <a:solidFill>
-                  <a:srgbClr val="000000"/>
-                </a:solidFill>
-                <a:uFill>
-                  <a:solidFill>
-                    <a:srgbClr val="ffffff"/>
-                  </a:solidFill>
-                </a:uFill>
-                <a:latin typeface="Times New Roman"/>
-              </a:rPr>
-              <a:t>k</a:t>
-            </a:r>
-            <a:r>
-              <a:rPr b="0" lang="en-US" sz="2160" spc="-1" strike="noStrike">
-                <a:solidFill>
-                  <a:srgbClr val="000000"/>
-                </a:solidFill>
-                <a:uFill>
-                  <a:solidFill>
-                    <a:srgbClr val="ffffff"/>
-                  </a:solidFill>
-                </a:uFill>
-                <a:latin typeface="Times New Roman"/>
-              </a:rPr>
-              <a:t>e</a:t>
-            </a:r>
-            <a:r>
-              <a:rPr b="0" lang="en-US" sz="2160" spc="-1" strike="noStrike">
-                <a:solidFill>
-                  <a:srgbClr val="000000"/>
-                </a:solidFill>
-                <a:uFill>
-                  <a:solidFill>
-                    <a:srgbClr val="ffffff"/>
-                  </a:solidFill>
-                </a:uFill>
-                <a:latin typeface="Times New Roman"/>
-              </a:rPr>
-              <a:t>n</a:t>
-            </a:r>
-            <a:r>
-              <a:rPr b="0" lang="en-US" sz="2160" spc="-1" strike="noStrike">
-                <a:solidFill>
-                  <a:srgbClr val="000000"/>
-                </a:solidFill>
-                <a:uFill>
-                  <a:solidFill>
-                    <a:srgbClr val="ffffff"/>
-                  </a:solidFill>
-                </a:uFill>
-                <a:latin typeface="Times New Roman"/>
-              </a:rPr>
-              <a:t> </a:t>
-            </a:r>
-            <a:r>
-              <a:rPr b="0" lang="en-US" sz="2160" spc="-1" strike="noStrike">
-                <a:solidFill>
-                  <a:srgbClr val="000000"/>
-                </a:solidFill>
-                <a:uFill>
-                  <a:solidFill>
-                    <a:srgbClr val="ffffff"/>
-                  </a:solidFill>
-                </a:uFill>
-                <a:latin typeface="Times New Roman"/>
-              </a:rPr>
-              <a:t>b</a:t>
-            </a:r>
-            <a:r>
-              <a:rPr b="0" lang="en-US" sz="2160" spc="-1" strike="noStrike">
-                <a:solidFill>
-                  <a:srgbClr val="000000"/>
-                </a:solidFill>
-                <a:uFill>
-                  <a:solidFill>
-                    <a:srgbClr val="ffffff"/>
-                  </a:solidFill>
-                </a:uFill>
-                <a:latin typeface="Times New Roman"/>
-              </a:rPr>
-              <a:t>e</a:t>
-            </a:r>
-            <a:r>
-              <a:rPr b="0" lang="en-US" sz="2160" spc="-1" strike="noStrike">
-                <a:solidFill>
-                  <a:srgbClr val="000000"/>
-                </a:solidFill>
-                <a:uFill>
-                  <a:solidFill>
-                    <a:srgbClr val="ffffff"/>
-                  </a:solidFill>
-                </a:uFill>
-                <a:latin typeface="Times New Roman"/>
-              </a:rPr>
-              <a:t>a</a:t>
-            </a:r>
-            <a:r>
-              <a:rPr b="0" lang="en-US" sz="2160" spc="-1" strike="noStrike">
-                <a:solidFill>
-                  <a:srgbClr val="000000"/>
-                </a:solidFill>
-                <a:uFill>
-                  <a:solidFill>
-                    <a:srgbClr val="ffffff"/>
-                  </a:solidFill>
-                </a:uFill>
-                <a:latin typeface="Times New Roman"/>
-              </a:rPr>
-              <a:t>r</a:t>
-            </a:r>
-            <a:r>
-              <a:rPr b="0" lang="en-US" sz="2160" spc="-1" strike="noStrike">
-                <a:solidFill>
-                  <a:srgbClr val="000000"/>
-                </a:solidFill>
-                <a:uFill>
-                  <a:solidFill>
-                    <a:srgbClr val="ffffff"/>
-                  </a:solidFill>
-                </a:uFill>
-                <a:latin typeface="Times New Roman"/>
-              </a:rPr>
-              <a:t>b</a:t>
-            </a:r>
-            <a:r>
-              <a:rPr b="0" lang="en-US" sz="2160" spc="-1" strike="noStrike">
-                <a:solidFill>
-                  <a:srgbClr val="000000"/>
-                </a:solidFill>
-                <a:uFill>
-                  <a:solidFill>
-                    <a:srgbClr val="ffffff"/>
-                  </a:solidFill>
-                </a:uFill>
-                <a:latin typeface="Times New Roman"/>
-              </a:rPr>
-              <a:t>e</a:t>
-            </a:r>
-            <a:r>
-              <a:rPr b="0" lang="en-US" sz="2160" spc="-1" strike="noStrike">
-                <a:solidFill>
-                  <a:srgbClr val="000000"/>
-                </a:solidFill>
-                <a:uFill>
-                  <a:solidFill>
-                    <a:srgbClr val="ffffff"/>
-                  </a:solidFill>
-                </a:uFill>
-                <a:latin typeface="Times New Roman"/>
-              </a:rPr>
-              <a:t>i</a:t>
-            </a:r>
-            <a:r>
-              <a:rPr b="0" lang="en-US" sz="2160" spc="-1" strike="noStrike">
-                <a:solidFill>
-                  <a:srgbClr val="000000"/>
-                </a:solidFill>
-                <a:uFill>
-                  <a:solidFill>
-                    <a:srgbClr val="ffffff"/>
-                  </a:solidFill>
-                </a:uFill>
-                <a:latin typeface="Times New Roman"/>
-              </a:rPr>
-              <a:t>t</a:t>
-            </a:r>
-            <a:r>
-              <a:rPr b="0" lang="en-US" sz="2160" spc="-1" strike="noStrike">
-                <a:solidFill>
-                  <a:srgbClr val="000000"/>
-                </a:solidFill>
-                <a:uFill>
-                  <a:solidFill>
-                    <a:srgbClr val="ffffff"/>
-                  </a:solidFill>
-                </a:uFill>
-                <a:latin typeface="Times New Roman"/>
-              </a:rPr>
-              <a:t>e</a:t>
-            </a:r>
-            <a:r>
-              <a:rPr b="0" lang="en-US" sz="2160" spc="-1" strike="noStrike">
-                <a:solidFill>
-                  <a:srgbClr val="000000"/>
-                </a:solidFill>
-                <a:uFill>
-                  <a:solidFill>
-                    <a:srgbClr val="ffffff"/>
-                  </a:solidFill>
-                </a:uFill>
-                <a:latin typeface="Times New Roman"/>
-              </a:rPr>
-              <a:t>n</a:t>
+              <a:t>Format des Titeltextes durch Klicken bearbeiten</a:t>
             </a:r>
             <a:endParaRPr b="0" lang="en-US" sz="2160" spc="-1" strike="noStrike">
               <a:solidFill>
@@ -4358,9 +3714,17 @@
           <a:prstGeom prst="rect">
             <a:avLst/>
           </a:prstGeom>
-          <a:solidFill>
-            <a:srgbClr val="009999"/>
-          </a:solidFill>
+          <a:gradFill>
+            <a:gsLst>
+              <a:gs pos="0">
+                <a:srgbClr val="006666"/>
+              </a:gs>
+              <a:gs pos="100000">
+                <a:srgbClr val="00cccc"/>
+              </a:gs>
+            </a:gsLst>
+            <a:path path="circle"/>
+          </a:gradFill>
           <a:ln w="25560">
             <a:noFill/>
           </a:ln>
@@ -4386,11 +3750,17 @@
           <a:prstGeom prst="rect">
             <a:avLst/>
           </a:prstGeom>
-          <a:solidFill>
-            <a:srgbClr val="009999">
-              <a:alpha val="20000"/>
-            </a:srgbClr>
-          </a:solidFill>
+          <a:gradFill>
+            <a:gsLst>
+              <a:gs pos="0">
+                <a:srgbClr val="006666"/>
+              </a:gs>
+              <a:gs pos="100000">
+                <a:srgbClr val="00cccc"/>
+              </a:gs>
+            </a:gsLst>
+            <a:path path="circle"/>
+          </a:gradFill>
           <a:ln w="25560">
             <a:noFill/>
           </a:ln>

</xml_diff>